<commit_message>
iot modified:   iot/NodeJs1.odp new file:   iot/NodeJs1_Ancona.pptx new file:   iot/NodeJs1_AnconaENG.pptx new file:   iot/NodeJs1_ENG.odp modified:   iot/NodeJs2.odp modified:   iot/NodeRED.odp modified:   iot/NodeRED_Ancona.pptx new file:   iot/NodeRED_AnconaENG.pptx modified:   iot/NodeRED_ENG.odp new file:   iot/images/innerNodes.png new file:   iot/images/line.odg new file:   iot/images/line.png new file:   iot/images/sinkNodesENG.png new file:   iot/images/sourceNodesENG.png new file:   iot/images/switchNodeENG.png
</commit_message>
<xml_diff>
--- a/iot/NodeRED_Ancona.pptx
+++ b/iot/NodeRED_Ancona.pptx
@@ -378,7 +378,7 @@
             <a:pPr indent="0" algn="r">
               <a:buNone/>
             </a:pPr>
-            <a:fld id="{347A7FA0-D9F5-4481-A6DD-2A4D32AB596F}" type="slidenum">
+            <a:fld id="{D466BB35-64F6-46D7-90DE-783E0BD9223A}" type="slidenum">
               <a:rPr b="0" lang="en-US" sz="1400" spc="-1" strike="noStrike">
                 <a:solidFill>
                   <a:srgbClr val="000000"/>
@@ -581,7 +581,7 @@
                 <a:tab algn="l" pos="2895480"/>
               </a:tabLst>
             </a:pPr>
-            <a:fld id="{4BE45C64-B07A-433F-9A53-32D0BA7CBA23}" type="slidenum">
+            <a:fld id="{5AAB3DA7-A607-4F6B-ACF2-7AF5D779560F}" type="slidenum">
               <a:rPr b="0" lang="it-IT" sz="1400" spc="-1" strike="noStrike">
                 <a:solidFill>
                   <a:srgbClr val="000000"/>
@@ -1141,7 +1141,7 @@
                 <a:tab algn="l" pos="2895480"/>
               </a:tabLst>
             </a:pPr>
-            <a:fld id="{E8E17F07-69FE-4024-B3B3-09FC9A8A9EEE}" type="slidenum">
+            <a:fld id="{51F3A345-7A13-4FFD-90F3-25F68DCA206A}" type="slidenum">
               <a:rPr b="0" lang="it-IT" sz="1400" spc="-1" strike="noStrike">
                 <a:solidFill>
                   <a:srgbClr val="000000"/>
@@ -1480,7 +1480,7 @@
                 <a:tab algn="l" pos="2895480"/>
               </a:tabLst>
             </a:pPr>
-            <a:fld id="{CCBFB34B-D357-4F90-9E16-A82799B89197}" type="slidenum">
+            <a:fld id="{4D837481-DAB8-4526-A221-576DDD4942EE}" type="slidenum">
               <a:rPr b="0" lang="it-IT" sz="1400" spc="-1" strike="noStrike">
                 <a:solidFill>
                   <a:srgbClr val="000000"/>
@@ -1819,7 +1819,7 @@
                 <a:tab algn="l" pos="2895480"/>
               </a:tabLst>
             </a:pPr>
-            <a:fld id="{52D0013A-E98D-489D-A9B6-931E165C0297}" type="slidenum">
+            <a:fld id="{000611CF-55CF-4D85-81AB-62F02045A36E}" type="slidenum">
               <a:rPr b="0" lang="it-IT" sz="1400" spc="-1" strike="noStrike">
                 <a:solidFill>
                   <a:srgbClr val="000000"/>
@@ -2158,7 +2158,7 @@
                 <a:tab algn="l" pos="2895480"/>
               </a:tabLst>
             </a:pPr>
-            <a:fld id="{4F721B01-8659-4F02-8830-CD39B74968E0}" type="slidenum">
+            <a:fld id="{810522FD-6217-4A76-A233-7252FE6F1163}" type="slidenum">
               <a:rPr b="0" lang="it-IT" sz="1400" spc="-1" strike="noStrike">
                 <a:solidFill>
                   <a:srgbClr val="000000"/>
@@ -2863,7 +2863,7 @@
                 <a:tab algn="l" pos="2895480"/>
               </a:tabLst>
             </a:pPr>
-            <a:fld id="{41273411-88EC-478C-A3CE-0EF3D7656E8D}" type="slidenum">
+            <a:fld id="{1BF9139F-01AA-4962-8F9E-37BCD11FC2BF}" type="slidenum">
               <a:rPr b="0" lang="it-IT" sz="1400" spc="-1" strike="noStrike">
                 <a:solidFill>
                   <a:srgbClr val="000000"/>
@@ -3191,7 +3191,7 @@
                 <a:tab algn="l" pos="2895480"/>
               </a:tabLst>
             </a:pPr>
-            <a:fld id="{58E37862-A934-41CC-8BFC-06494C7571D7}" type="slidenum">
+            <a:fld id="{A67D98DC-0445-42E2-ADF6-3B04B667F7FA}" type="slidenum">
               <a:rPr b="0" lang="it-IT" sz="1400" spc="-1" strike="noStrike">
                 <a:solidFill>
                   <a:srgbClr val="000000"/>
@@ -3519,7 +3519,7 @@
                 <a:tab algn="l" pos="2895480"/>
               </a:tabLst>
             </a:pPr>
-            <a:fld id="{5B302AEA-61F7-4630-99E0-608934C33B66}" type="slidenum">
+            <a:fld id="{F2DE1CB3-8781-4449-8309-6098E48F0930}" type="slidenum">
               <a:rPr b="0" lang="it-IT" sz="1400" spc="-1" strike="noStrike">
                 <a:solidFill>
                   <a:srgbClr val="000000"/>
@@ -3858,7 +3858,7 @@
                 <a:tab algn="l" pos="2895480"/>
               </a:tabLst>
             </a:pPr>
-            <a:fld id="{33C777E9-B291-41DC-8730-238A4161E532}" type="slidenum">
+            <a:fld id="{CE85188A-AC45-49F2-B994-2AB688E450B0}" type="slidenum">
               <a:rPr b="0" lang="it-IT" sz="1400" spc="-1" strike="noStrike">
                 <a:solidFill>
                   <a:srgbClr val="000000"/>
@@ -4418,7 +4418,7 @@
                 <a:tab algn="l" pos="2895480"/>
               </a:tabLst>
             </a:pPr>
-            <a:fld id="{8D6C4186-0214-4FE7-BB1C-0BD6DAAC7A87}" type="slidenum">
+            <a:fld id="{739A8248-CC1B-42DF-AEB7-0AF39D203664}" type="slidenum">
               <a:rPr b="0" lang="it-IT" sz="1400" spc="-1" strike="noStrike">
                 <a:solidFill>
                   <a:srgbClr val="000000"/>
@@ -4757,7 +4757,7 @@
                 <a:tab algn="l" pos="2895480"/>
               </a:tabLst>
             </a:pPr>
-            <a:fld id="{50414587-1239-4608-8CC2-5F137E9756B2}" type="slidenum">
+            <a:fld id="{894ACE0A-BAED-45DB-8D9C-A59BAEE576BB}" type="slidenum">
               <a:rPr b="0" lang="it-IT" sz="1400" spc="-1" strike="noStrike">
                 <a:solidFill>
                   <a:srgbClr val="000000"/>
@@ -5096,7 +5096,7 @@
                 <a:tab algn="l" pos="2895480"/>
               </a:tabLst>
             </a:pPr>
-            <a:fld id="{31B23607-BC59-4CD0-8E0C-048AA7F267C6}" type="slidenum">
+            <a:fld id="{2F2F3F7A-074E-43E3-B65C-D3F606574A7A}" type="slidenum">
               <a:rPr b="0" lang="it-IT" sz="1400" spc="-1" strike="noStrike">
                 <a:solidFill>
                   <a:srgbClr val="000000"/>
@@ -6102,7 +6102,7 @@
         <p:txBody>
           <a:bodyPr/>
           <a:p>
-            <a:fld id="{BE65CEE3-D192-47AA-AF16-515683F46D23}" type="slidenum">
+            <a:fld id="{4D84F3C3-5A17-4380-A160-0192BE1F1C1D}" type="slidenum">
               <a:t>&lt;#&gt;</a:t>
             </a:fld>
           </a:p>
@@ -6244,7 +6244,7 @@
         <p:txBody>
           <a:bodyPr/>
           <a:p>
-            <a:fld id="{FE56359B-BB57-4EF5-8347-31259BFA54B7}" type="slidenum">
+            <a:fld id="{CB914332-66CB-434E-948C-0160B0B7780C}" type="slidenum">
               <a:t>&lt;#&gt;</a:t>
             </a:fld>
           </a:p>
@@ -11397,7 +11397,7 @@
                 <a:tab algn="l" pos="0"/>
               </a:tabLst>
             </a:pPr>
-            <a:fld id="{A6965697-974F-4BD7-88C0-57511E3AD854}" type="slidenum">
+            <a:fld id="{AEF6940A-2EC5-411C-AD9C-CA9412108E07}" type="slidenum">
               <a:rPr b="0" lang="it-IT" sz="800" spc="-1" strike="noStrike">
                 <a:solidFill>
                   <a:srgbClr val="000000"/>
@@ -11673,7 +11673,7 @@
                 <a:tab algn="l" pos="0"/>
               </a:tabLst>
             </a:pPr>
-            <a:fld id="{3A70EA9E-85F8-463A-89CD-E7BA2FAFA1EB}" type="slidenum">
+            <a:fld id="{E5543900-428C-459B-9207-3F42AE3DAF3B}" type="slidenum">
               <a:rPr b="0" lang="it-IT" sz="989" spc="-1" strike="noStrike">
                 <a:solidFill>
                   <a:srgbClr val="888888"/>
@@ -20950,7 +20950,7 @@
                 <a:latin typeface="Arial"/>
                 <a:ea typeface="Microsoft YaHei"/>
               </a:rPr>
-              <a:t>l'applicazione raccoglie i dati da una stazione meteo dotata di sensori di temperatura, umidità e pressione</a:t>
+              <a:t>l'applicazione acquisisce dati da una stazione meteo dotata di sensori di temperatura, umidità e pressione</a:t>
             </a:r>
             <a:endParaRPr b="0" lang="en-US" sz="2400" spc="-1" strike="noStrike">
               <a:solidFill>
@@ -21002,7 +21002,7 @@
                 <a:latin typeface="Arial"/>
                 <a:ea typeface="Microsoft YaHei"/>
               </a:rPr>
-              <a:t>l'applicazione Node-RED si connette al server MQTT, estrae le informazioni rilevanti e le visualizza sulla dashboard</a:t>
+              <a:t>l'applicazione Node-RED si connette al server MQTT, elabora le informazioni rilevanti e le visualizza sulla dashboard</a:t>
             </a:r>
             <a:endParaRPr b="0" lang="en-US" sz="2400" spc="-1" strike="noStrike">
               <a:solidFill>
@@ -21884,7 +21884,7 @@
         <p:spPr>
           <a:xfrm>
             <a:off x="2102760" y="5406480"/>
-            <a:ext cx="8184240" cy="1680120"/>
+            <a:ext cx="7955640" cy="1992600"/>
           </a:xfrm>
           <a:prstGeom prst="rect">
             <a:avLst/>
@@ -21933,7 +21933,7 @@
                 <a:latin typeface="Arial"/>
                 <a:ea typeface="Microsoft YaHei"/>
               </a:rPr>
-              <a:t>ricezione dei dati, estrazione e visualizzazione mediante diagrammi e contatori</a:t>
+              <a:t>acquisizione dei dati, elaborazione e visualizzazione con diagrammi e contatori</a:t>
             </a:r>
             <a:endParaRPr b="0" lang="en-US" sz="2200" spc="-1" strike="noStrike">
               <a:solidFill>
@@ -22301,7 +22301,7 @@
                 <a:latin typeface="Arial"/>
                 <a:ea typeface="Microsoft YaHei"/>
               </a:rPr>
-              <a:t>nella side-bar la scheda “dashboard” permette di configurare le proprietà della pagina web che visualizza la dashboard dell'applicazione</a:t>
+              <a:t>nella side-bar la scheda “dashboard” permette di configurare le proprietà della pagina web dove la dashboard dell'applicazione è visualizzata</a:t>
             </a:r>
             <a:endParaRPr b="0" lang="en-US" sz="2400" spc="-1" strike="noStrike">
               <a:solidFill>
@@ -22346,7 +22346,7 @@
                 <a:latin typeface="Arial"/>
                 <a:ea typeface="Microsoft YaHei"/>
               </a:rPr>
-              <a:t>nella scheda “dashboard” la freccia in alto a destra permette di aprire il link alla dashboard</a:t>
+              <a:t>nella scheda “dashboard” la freccia in alto a destra punta al link della dashboard</a:t>
             </a:r>
             <a:endParaRPr b="0" lang="en-US" sz="2400" spc="-1" strike="noStrike">
               <a:solidFill>
@@ -22694,7 +22694,7 @@
                 <a:latin typeface="Arial"/>
                 <a:ea typeface="Microsoft YaHei"/>
               </a:rPr>
-              <a:t>il bottone “clear all data” nella dashboard cancella tutti i dati memorizzati nel diagramma</a:t>
+              <a:t>il bottone “clear all data” nella dashboard cancella tutti i dati visualizzati nel diagramma</a:t>
             </a:r>
             <a:endParaRPr b="0" lang="en-US" sz="2400" spc="-1" strike="noStrike">
               <a:solidFill>
@@ -23208,7 +23208,7 @@
         <p:spPr>
           <a:xfrm>
             <a:off x="502560" y="3250080"/>
-            <a:ext cx="8870040" cy="3828600"/>
+            <a:ext cx="8870040" cy="4168440"/>
           </a:xfrm>
           <a:prstGeom prst="rect">
             <a:avLst/>
@@ -23386,7 +23386,7 @@
                 <a:latin typeface="Arial"/>
                 <a:ea typeface="Microsoft YaHei"/>
               </a:rPr>
-              <a:t>come sviluppare in Node-RED una semplice applicazione IoT che raccoglie dati di sensori connessi alla rete </a:t>
+              <a:t>come sviluppare in Node-RED una semplice applicazione per l'acquisizione, elaborazione e visualizzazione di dati provenienti da dispositivi IoT</a:t>
             </a:r>
             <a:endParaRPr b="0" lang="en-US" sz="2400" spc="-1" strike="noStrike">
               <a:solidFill>
@@ -25921,33 +25921,7 @@
                 <a:latin typeface="Arial"/>
                 <a:ea typeface="Microsoft YaHei"/>
               </a:rPr>
-              <a:t>switch: smista il dato in ingresso su zero </a:t>
-            </a:r>
-            <a:endParaRPr b="0" lang="en-US" sz="2400" spc="-1" strike="noStrike">
-              <a:solidFill>
-                <a:srgbClr val="000000"/>
-              </a:solidFill>
-              <a:latin typeface="Arial"/>
-            </a:endParaRPr>
-          </a:p>
-          <a:p>
-            <a:pPr marL="216000" indent="-216000">
-              <a:buClr>
-                <a:srgbClr val="000000"/>
-              </a:buClr>
-              <a:buSzPct val="45000"/>
-              <a:buFont typeface="Wingdings" charset="2"/>
-              <a:buChar char=""/>
-            </a:pPr>
-            <a:r>
-              <a:rPr b="0" lang="it-IT" sz="2400" spc="-1" strike="noStrike">
-                <a:solidFill>
-                  <a:srgbClr val="000000"/>
-                </a:solidFill>
-                <a:latin typeface="Arial"/>
-                <a:ea typeface="Microsoft YaHei"/>
-              </a:rPr>
-              <a:t>o più uscite</a:t>
+              <a:t>switch: collega l'ingresso a zero o più uscite</a:t>
             </a:r>
             <a:endParaRPr b="0" lang="en-US" sz="2400" spc="-1" strike="noStrike">
               <a:solidFill>
@@ -26513,7 +26487,7 @@
                 <a:latin typeface="Arial"/>
                 <a:ea typeface="Microsoft YaHei"/>
               </a:rPr>
-              <a:t>lo sviluppo e l'esecuzione di un programma Node-RED vengono gestiti tramite un qualsiasi web browser </a:t>
+              <a:t>è possibile sviluppare e eseguire un programma Node-RED con un qualsiasi web browser </a:t>
             </a:r>
             <a:endParaRPr b="0" lang="en-US" sz="2400" spc="-1" strike="noStrike">
               <a:solidFill>
@@ -26929,7 +26903,7 @@
                 <a:latin typeface="Arial"/>
                 <a:ea typeface="Microsoft YaHei"/>
               </a:rPr>
-              <a:t>applicazione definita dall'utente in grado di interagire con l'esterno tramite diversi protocolli di comunicazione </a:t>
+              <a:t>applicazione definita dall'utente in grado di interagire con altre componenti connesse alla rete con diversi protocolli </a:t>
             </a:r>
             <a:endParaRPr b="0" lang="en-US" sz="2400" spc="-1" strike="noStrike">
               <a:solidFill>

</xml_diff>